<commit_message>
Add manager to presentation
</commit_message>
<xml_diff>
--- a/presentation.pptx
+++ b/presentation.pptx
@@ -5350,7 +5350,16 @@
                 </a:solidFill>
                 <a:latin typeface="Calibri"/>
               </a:rPr>
-              <a:t>Abstrakce komunikace s jednotlivými zařízeními</a:t>
+              <a:t>Abstrakce komunikace s jednotlivými </a:t>
+            </a:r>
+            <a:r>
+              <a:rPr b="0" lang="cs-CZ" sz="2000" spc="-1" strike="noStrike">
+                <a:solidFill>
+                  <a:srgbClr val="000000"/>
+                </a:solidFill>
+                <a:latin typeface="Calibri"/>
+              </a:rPr>
+              <a:t>zařízeními</a:t>
             </a:r>
             <a:endParaRPr b="0" lang="cs-CZ" sz="2000" spc="-1" strike="noStrike">
               <a:solidFill>
@@ -5424,7 +5433,16 @@
                 </a:solidFill>
                 <a:latin typeface="Calibri"/>
               </a:rPr>
-              <a:t>C portů</a:t>
+              <a:t>C </a:t>
+            </a:r>
+            <a:r>
+              <a:rPr b="0" lang="cs-CZ" sz="2000" spc="-1" strike="noStrike">
+                <a:solidFill>
+                  <a:srgbClr val="000000"/>
+                </a:solidFill>
+                <a:latin typeface="Calibri"/>
+              </a:rPr>
+              <a:t>portů</a:t>
             </a:r>
             <a:endParaRPr b="0" lang="cs-CZ" sz="2000" spc="-1" strike="noStrike">
               <a:solidFill>
@@ -5535,7 +5553,16 @@
             <a:noAutofit/>
           </a:bodyPr>
           <a:p>
-            <a:endParaRPr b="0" lang="cs-CZ" sz="1800" spc="-1" strike="noStrike">
+            <a:r>
+              <a:rPr b="0" lang="cs-CZ" sz="4400" spc="-1" strike="noStrike">
+                <a:solidFill>
+                  <a:srgbClr val="000000"/>
+                </a:solidFill>
+                <a:latin typeface="Calibri"/>
+              </a:rPr>
+              <a:t>Manager</a:t>
+            </a:r>
+            <a:endParaRPr b="0" lang="cs-CZ" sz="4400" spc="-1" strike="noStrike">
               <a:solidFill>
                 <a:srgbClr val="000000"/>
               </a:solidFill>
@@ -5553,7 +5580,7 @@
         <p:spPr>
           <a:xfrm>
             <a:off x="838080" y="1825560"/>
-            <a:ext cx="10515240" cy="4350960"/>
+            <a:ext cx="7081920" cy="4350960"/>
           </a:xfrm>
           <a:prstGeom prst="rect">
             <a:avLst/>
@@ -5568,6 +5595,63 @@
             <a:noAutofit/>
           </a:bodyPr>
           <a:p>
+            <a:pPr marL="432000" indent="-324000">
+              <a:spcBef>
+                <a:spcPts val="1417"/>
+              </a:spcBef>
+              <a:buClr>
+                <a:srgbClr val="000000"/>
+              </a:buClr>
+              <a:buSzPct val="45000"/>
+              <a:buFont typeface="Wingdings" charset="2"/>
+              <a:buChar char=""/>
+            </a:pPr>
+            <a:r>
+              <a:rPr b="0" lang="cs-CZ" sz="2800" spc="-1" strike="noStrike">
+                <a:solidFill>
+                  <a:srgbClr val="000000"/>
+                </a:solidFill>
+                <a:latin typeface="Calibri"/>
+              </a:rPr>
+              <a:t>Práce s knihovnou jako celkem</a:t>
+            </a:r>
+            <a:endParaRPr b="0" lang="cs-CZ" sz="2800" spc="-1" strike="noStrike">
+              <a:solidFill>
+                <a:srgbClr val="000000"/>
+              </a:solidFill>
+              <a:latin typeface="Calibri"/>
+            </a:endParaRPr>
+          </a:p>
+          <a:p>
+            <a:pPr marL="432000" indent="-324000">
+              <a:spcBef>
+                <a:spcPts val="1417"/>
+              </a:spcBef>
+              <a:buClr>
+                <a:srgbClr val="000000"/>
+              </a:buClr>
+              <a:buSzPct val="45000"/>
+              <a:buFont typeface="Wingdings" charset="2"/>
+              <a:buChar char=""/>
+            </a:pPr>
+            <a:r>
+              <a:rPr b="0" lang="cs-CZ" sz="2800" spc="-1" strike="noStrike">
+                <a:solidFill>
+                  <a:srgbClr val="000000"/>
+                </a:solidFill>
+                <a:latin typeface="Calibri"/>
+              </a:rPr>
+              <a:t>Zajišťuje nekolizní chování </a:t>
+            </a:r>
+            <a:r>
+              <a:rPr b="0" lang="cs-CZ" sz="2800" spc="-1" strike="noStrike">
+                <a:solidFill>
+                  <a:srgbClr val="000000"/>
+                </a:solidFill>
+                <a:latin typeface="Calibri"/>
+              </a:rPr>
+              <a:t>jednotlivých prvků</a:t>
+            </a:r>
             <a:endParaRPr b="0" lang="cs-CZ" sz="2800" spc="-1" strike="noStrike">
               <a:solidFill>
                 <a:srgbClr val="000000"/>
@@ -5623,6 +5707,52 @@
           </a:p>
         </p:txBody>
       </p:sp>
+      <p:pic>
+        <p:nvPicPr>
+          <p:cNvPr id="100" name="" descr=""/>
+          <p:cNvPicPr/>
+          <p:nvPr/>
+        </p:nvPicPr>
+        <p:blipFill>
+          <a:blip r:embed="rId1"/>
+          <a:stretch/>
+        </p:blipFill>
+        <p:spPr>
+          <a:xfrm>
+            <a:off x="8280000" y="1412640"/>
+            <a:ext cx="2880000" cy="1541520"/>
+          </a:xfrm>
+          <a:prstGeom prst="rect">
+            <a:avLst/>
+          </a:prstGeom>
+          <a:ln w="0">
+            <a:noFill/>
+          </a:ln>
+        </p:spPr>
+      </p:pic>
+      <p:pic>
+        <p:nvPicPr>
+          <p:cNvPr id="101" name="" descr=""/>
+          <p:cNvPicPr/>
+          <p:nvPr/>
+        </p:nvPicPr>
+        <p:blipFill>
+          <a:blip r:embed="rId2"/>
+          <a:stretch/>
+        </p:blipFill>
+        <p:spPr>
+          <a:xfrm>
+            <a:off x="8100000" y="3142800"/>
+            <a:ext cx="3240000" cy="3157200"/>
+          </a:xfrm>
+          <a:prstGeom prst="rect">
+            <a:avLst/>
+          </a:prstGeom>
+          <a:ln w="0">
+            <a:noFill/>
+          </a:ln>
+        </p:spPr>
+      </p:pic>
     </p:spTree>
   </p:cSld>
   <mc:AlternateContent>
@@ -5655,7 +5785,7 @@
       </p:grpSpPr>
       <p:sp>
         <p:nvSpPr>
-          <p:cNvPr id="100" name="Nadpis 1_1"/>
+          <p:cNvPr id="102" name="Nadpis 1_1"/>
           <p:cNvSpPr txBox="1"/>
           <p:nvPr/>
         </p:nvSpPr>
@@ -5688,7 +5818,7 @@
       </p:sp>
       <p:sp>
         <p:nvSpPr>
-          <p:cNvPr id="101" name="Zástupný symbol pro obsah 2_1"/>
+          <p:cNvPr id="103" name="Zástupný symbol pro obsah 2_1"/>
           <p:cNvSpPr txBox="1"/>
           <p:nvPr/>
         </p:nvSpPr>
@@ -5721,7 +5851,7 @@
       </p:sp>
       <p:sp>
         <p:nvSpPr>
-          <p:cNvPr id="102" name="Zástupný symbol pro zápatí 3_1"/>
+          <p:cNvPr id="104" name="Zástupný symbol pro zápatí 3_1"/>
           <p:cNvSpPr txBox="1"/>
           <p:nvPr/>
         </p:nvSpPr>

</xml_diff>